<commit_message>
Updated presentation and colab
</commit_message>
<xml_diff>
--- a/LicensePlatePresentation.pptx
+++ b/LicensePlatePresentation.pptx
@@ -716,6 +716,180 @@
           <a:bodyPr/>
           <a:lstStyle/>
           <a:p>
+            <a:r>
+              <a:rPr lang="en-US" dirty="0"/>
+              <a:t>6</a:t>
+            </a:r>
+          </a:p>
+        </p:txBody>
+      </p:sp>
+      <p:sp>
+        <p:nvSpPr>
+          <p:cNvPr id="4" name="Segnaposto numero diapositiva 3"/>
+          <p:cNvSpPr>
+            <a:spLocks noGrp="1"/>
+          </p:cNvSpPr>
+          <p:nvPr>
+            <p:ph type="sldNum" sz="quarter" idx="5"/>
+          </p:nvPr>
+        </p:nvSpPr>
+        <p:spPr/>
+        <p:txBody>
+          <a:bodyPr/>
+          <a:lstStyle/>
+          <a:p>
+            <a:fld id="{CDF59EFB-1334-4D27-AB1B-4993812541CF}" type="slidenum">
+              <a:rPr lang="it-IT" smtClean="0"/>
+              <a:t>6</a:t>
+            </a:fld>
+            <a:endParaRPr lang="it-IT"/>
+          </a:p>
+        </p:txBody>
+      </p:sp>
+    </p:spTree>
+    <p:extLst>
+      <p:ext uri="{BB962C8B-B14F-4D97-AF65-F5344CB8AC3E}">
+        <p14:creationId xmlns:p14="http://schemas.microsoft.com/office/powerpoint/2010/main" val="3649542117"/>
+      </p:ext>
+    </p:extLst>
+  </p:cSld>
+  <p:clrMapOvr>
+    <a:masterClrMapping/>
+  </p:clrMapOvr>
+</p:notes>
+</file>
+
+<file path=ppt/notesSlides/notesSlide2.xml><?xml version="1.0" encoding="utf-8"?>
+<p:notes xmlns:a="http://schemas.openxmlformats.org/drawingml/2006/main" xmlns:r="http://schemas.openxmlformats.org/officeDocument/2006/relationships" xmlns:p="http://schemas.openxmlformats.org/presentationml/2006/main">
+  <p:cSld>
+    <p:spTree>
+      <p:nvGrpSpPr>
+        <p:cNvPr id="1" name=""/>
+        <p:cNvGrpSpPr/>
+        <p:nvPr/>
+      </p:nvGrpSpPr>
+      <p:grpSpPr>
+        <a:xfrm>
+          <a:off x="0" y="0"/>
+          <a:ext cx="0" cy="0"/>
+          <a:chOff x="0" y="0"/>
+          <a:chExt cx="0" cy="0"/>
+        </a:xfrm>
+      </p:grpSpPr>
+      <p:sp>
+        <p:nvSpPr>
+          <p:cNvPr id="2" name="Segnaposto immagine diapositiva 1"/>
+          <p:cNvSpPr>
+            <a:spLocks noGrp="1" noRot="1" noChangeAspect="1"/>
+          </p:cNvSpPr>
+          <p:nvPr>
+            <p:ph type="sldImg"/>
+          </p:nvPr>
+        </p:nvSpPr>
+        <p:spPr/>
+      </p:sp>
+      <p:sp>
+        <p:nvSpPr>
+          <p:cNvPr id="3" name="Segnaposto note 2"/>
+          <p:cNvSpPr>
+            <a:spLocks noGrp="1"/>
+          </p:cNvSpPr>
+          <p:nvPr>
+            <p:ph type="body" idx="1"/>
+          </p:nvPr>
+        </p:nvSpPr>
+        <p:spPr/>
+        <p:txBody>
+          <a:bodyPr/>
+          <a:lstStyle/>
+          <a:p>
+            <a:r>
+              <a:rPr lang="en-US" dirty="0"/>
+              <a:t>77</a:t>
+            </a:r>
+          </a:p>
+        </p:txBody>
+      </p:sp>
+      <p:sp>
+        <p:nvSpPr>
+          <p:cNvPr id="4" name="Segnaposto numero diapositiva 3"/>
+          <p:cNvSpPr>
+            <a:spLocks noGrp="1"/>
+          </p:cNvSpPr>
+          <p:nvPr>
+            <p:ph type="sldNum" sz="quarter" idx="5"/>
+          </p:nvPr>
+        </p:nvSpPr>
+        <p:spPr/>
+        <p:txBody>
+          <a:bodyPr/>
+          <a:lstStyle/>
+          <a:p>
+            <a:fld id="{CDF59EFB-1334-4D27-AB1B-4993812541CF}" type="slidenum">
+              <a:rPr lang="it-IT" smtClean="0"/>
+              <a:t>7</a:t>
+            </a:fld>
+            <a:endParaRPr lang="it-IT"/>
+          </a:p>
+        </p:txBody>
+      </p:sp>
+    </p:spTree>
+    <p:extLst>
+      <p:ext uri="{BB962C8B-B14F-4D97-AF65-F5344CB8AC3E}">
+        <p14:creationId xmlns:p14="http://schemas.microsoft.com/office/powerpoint/2010/main" val="4174573470"/>
+      </p:ext>
+    </p:extLst>
+  </p:cSld>
+  <p:clrMapOvr>
+    <a:masterClrMapping/>
+  </p:clrMapOvr>
+</p:notes>
+</file>
+
+<file path=ppt/notesSlides/notesSlide3.xml><?xml version="1.0" encoding="utf-8"?>
+<p:notes xmlns:a="http://schemas.openxmlformats.org/drawingml/2006/main" xmlns:r="http://schemas.openxmlformats.org/officeDocument/2006/relationships" xmlns:p="http://schemas.openxmlformats.org/presentationml/2006/main">
+  <p:cSld>
+    <p:spTree>
+      <p:nvGrpSpPr>
+        <p:cNvPr id="1" name=""/>
+        <p:cNvGrpSpPr/>
+        <p:nvPr/>
+      </p:nvGrpSpPr>
+      <p:grpSpPr>
+        <a:xfrm>
+          <a:off x="0" y="0"/>
+          <a:ext cx="0" cy="0"/>
+          <a:chOff x="0" y="0"/>
+          <a:chExt cx="0" cy="0"/>
+        </a:xfrm>
+      </p:grpSpPr>
+      <p:sp>
+        <p:nvSpPr>
+          <p:cNvPr id="2" name="Segnaposto immagine diapositiva 1"/>
+          <p:cNvSpPr>
+            <a:spLocks noGrp="1" noRot="1" noChangeAspect="1"/>
+          </p:cNvSpPr>
+          <p:nvPr>
+            <p:ph type="sldImg"/>
+          </p:nvPr>
+        </p:nvSpPr>
+        <p:spPr/>
+      </p:sp>
+      <p:sp>
+        <p:nvSpPr>
+          <p:cNvPr id="3" name="Segnaposto note 2"/>
+          <p:cNvSpPr>
+            <a:spLocks noGrp="1"/>
+          </p:cNvSpPr>
+          <p:nvPr>
+            <p:ph type="body" idx="1"/>
+          </p:nvPr>
+        </p:nvSpPr>
+        <p:spPr/>
+        <p:txBody>
+          <a:bodyPr/>
+          <a:lstStyle/>
+          <a:p>
             <a:endParaRPr lang="en-US" dirty="0"/>
           </a:p>
         </p:txBody>
@@ -756,7 +930,7 @@
 </p:notes>
 </file>
 
-<file path=ppt/notesSlides/notesSlide2.xml><?xml version="1.0" encoding="utf-8"?>
+<file path=ppt/notesSlides/notesSlide4.xml><?xml version="1.0" encoding="utf-8"?>
 <p:notes xmlns:a="http://schemas.openxmlformats.org/drawingml/2006/main" xmlns:r="http://schemas.openxmlformats.org/officeDocument/2006/relationships" xmlns:p="http://schemas.openxmlformats.org/presentationml/2006/main">
   <p:cSld>
     <p:spTree>
@@ -864,7 +1038,7 @@
 </p:notes>
 </file>
 
-<file path=ppt/notesSlides/notesSlide3.xml><?xml version="1.0" encoding="utf-8"?>
+<file path=ppt/notesSlides/notesSlide5.xml><?xml version="1.0" encoding="utf-8"?>
 <p:notes xmlns:a="http://schemas.openxmlformats.org/drawingml/2006/main" xmlns:r="http://schemas.openxmlformats.org/officeDocument/2006/relationships" xmlns:p="http://schemas.openxmlformats.org/presentationml/2006/main">
   <p:cSld>
     <p:spTree>
@@ -926,7 +1100,10 @@
           <a:bodyPr/>
           <a:lstStyle/>
           <a:p>
-            <a:endParaRPr lang="en-US" dirty="0"/>
+            <a:r>
+              <a:rPr lang="en-US" dirty="0"/>
+              <a:t>3</a:t>
+            </a:r>
           </a:p>
         </p:txBody>
       </p:sp>
@@ -972,7 +1149,7 @@
 </p:notes>
 </file>
 
-<file path=ppt/notesSlides/notesSlide4.xml><?xml version="1.0" encoding="utf-8"?>
+<file path=ppt/notesSlides/notesSlide6.xml><?xml version="1.0" encoding="utf-8"?>
 <p:notes xmlns:a="http://schemas.openxmlformats.org/drawingml/2006/main" xmlns:r="http://schemas.openxmlformats.org/officeDocument/2006/relationships" xmlns:p="http://schemas.openxmlformats.org/presentationml/2006/main">
   <p:cSld>
     <p:spTree>
@@ -1034,7 +1211,10 @@
           <a:bodyPr/>
           <a:lstStyle/>
           <a:p>
-            <a:endParaRPr lang="en-US" dirty="0"/>
+            <a:r>
+              <a:rPr lang="en-US" dirty="0"/>
+              <a:t>4</a:t>
+            </a:r>
           </a:p>
         </p:txBody>
       </p:sp>
@@ -1071,6 +1251,177 @@
     <p:extLst>
       <p:ext uri="{BB962C8B-B14F-4D97-AF65-F5344CB8AC3E}">
         <p14:creationId xmlns:p14="http://schemas.microsoft.com/office/powerpoint/2010/main" val="35575913"/>
+      </p:ext>
+    </p:extLst>
+  </p:cSld>
+  <p:clrMapOvr>
+    <a:masterClrMapping/>
+  </p:clrMapOvr>
+</p:notes>
+</file>
+
+<file path=ppt/notesSlides/notesSlide7.xml><?xml version="1.0" encoding="utf-8"?>
+<p:notes xmlns:a="http://schemas.openxmlformats.org/drawingml/2006/main" xmlns:r="http://schemas.openxmlformats.org/officeDocument/2006/relationships" xmlns:p="http://schemas.openxmlformats.org/presentationml/2006/main">
+  <p:cSld>
+    <p:spTree>
+      <p:nvGrpSpPr>
+        <p:cNvPr id="1" name=""/>
+        <p:cNvGrpSpPr/>
+        <p:nvPr/>
+      </p:nvGrpSpPr>
+      <p:grpSpPr>
+        <a:xfrm>
+          <a:off x="0" y="0"/>
+          <a:ext cx="0" cy="0"/>
+          <a:chOff x="0" y="0"/>
+          <a:chExt cx="0" cy="0"/>
+        </a:xfrm>
+      </p:grpSpPr>
+      <p:sp>
+        <p:nvSpPr>
+          <p:cNvPr id="2" name="Segnaposto immagine diapositiva 1"/>
+          <p:cNvSpPr>
+            <a:spLocks noGrp="1" noRot="1" noChangeAspect="1"/>
+          </p:cNvSpPr>
+          <p:nvPr>
+            <p:ph type="sldImg"/>
+          </p:nvPr>
+        </p:nvSpPr>
+        <p:spPr/>
+      </p:sp>
+      <p:sp>
+        <p:nvSpPr>
+          <p:cNvPr id="3" name="Segnaposto note 2"/>
+          <p:cNvSpPr>
+            <a:spLocks noGrp="1"/>
+          </p:cNvSpPr>
+          <p:nvPr>
+            <p:ph type="body" idx="1"/>
+          </p:nvPr>
+        </p:nvSpPr>
+        <p:spPr/>
+        <p:txBody>
+          <a:bodyPr/>
+          <a:lstStyle/>
+          <a:p>
+            <a:r>
+              <a:rPr lang="en-US" dirty="0"/>
+              <a:t>5</a:t>
+            </a:r>
+          </a:p>
+        </p:txBody>
+      </p:sp>
+      <p:sp>
+        <p:nvSpPr>
+          <p:cNvPr id="4" name="Segnaposto numero diapositiva 3"/>
+          <p:cNvSpPr>
+            <a:spLocks noGrp="1"/>
+          </p:cNvSpPr>
+          <p:nvPr>
+            <p:ph type="sldNum" sz="quarter" idx="5"/>
+          </p:nvPr>
+        </p:nvSpPr>
+        <p:spPr/>
+        <p:txBody>
+          <a:bodyPr/>
+          <a:lstStyle/>
+          <a:p>
+            <a:fld id="{CDF59EFB-1334-4D27-AB1B-4993812541CF}" type="slidenum">
+              <a:rPr lang="it-IT" smtClean="0"/>
+              <a:t>15</a:t>
+            </a:fld>
+            <a:endParaRPr lang="it-IT"/>
+          </a:p>
+        </p:txBody>
+      </p:sp>
+    </p:spTree>
+    <p:extLst>
+      <p:ext uri="{BB962C8B-B14F-4D97-AF65-F5344CB8AC3E}">
+        <p14:creationId xmlns:p14="http://schemas.microsoft.com/office/powerpoint/2010/main" val="1539015409"/>
+      </p:ext>
+    </p:extLst>
+  </p:cSld>
+  <p:clrMapOvr>
+    <a:masterClrMapping/>
+  </p:clrMapOvr>
+</p:notes>
+</file>
+
+<file path=ppt/notesSlides/notesSlide8.xml><?xml version="1.0" encoding="utf-8"?>
+<p:notes xmlns:a="http://schemas.openxmlformats.org/drawingml/2006/main" xmlns:r="http://schemas.openxmlformats.org/officeDocument/2006/relationships" xmlns:p="http://schemas.openxmlformats.org/presentationml/2006/main">
+  <p:cSld>
+    <p:spTree>
+      <p:nvGrpSpPr>
+        <p:cNvPr id="1" name=""/>
+        <p:cNvGrpSpPr/>
+        <p:nvPr/>
+      </p:nvGrpSpPr>
+      <p:grpSpPr>
+        <a:xfrm>
+          <a:off x="0" y="0"/>
+          <a:ext cx="0" cy="0"/>
+          <a:chOff x="0" y="0"/>
+          <a:chExt cx="0" cy="0"/>
+        </a:xfrm>
+      </p:grpSpPr>
+      <p:sp>
+        <p:nvSpPr>
+          <p:cNvPr id="2" name="Segnaposto immagine diapositiva 1"/>
+          <p:cNvSpPr>
+            <a:spLocks noGrp="1" noRot="1" noChangeAspect="1"/>
+          </p:cNvSpPr>
+          <p:nvPr>
+            <p:ph type="sldImg"/>
+          </p:nvPr>
+        </p:nvSpPr>
+        <p:spPr/>
+      </p:sp>
+      <p:sp>
+        <p:nvSpPr>
+          <p:cNvPr id="3" name="Segnaposto note 2"/>
+          <p:cNvSpPr>
+            <a:spLocks noGrp="1"/>
+          </p:cNvSpPr>
+          <p:nvPr>
+            <p:ph type="body" idx="1"/>
+          </p:nvPr>
+        </p:nvSpPr>
+        <p:spPr/>
+        <p:txBody>
+          <a:bodyPr/>
+          <a:lstStyle/>
+          <a:p>
+            <a:endParaRPr lang="en-US" dirty="0"/>
+          </a:p>
+        </p:txBody>
+      </p:sp>
+      <p:sp>
+        <p:nvSpPr>
+          <p:cNvPr id="4" name="Segnaposto numero diapositiva 3"/>
+          <p:cNvSpPr>
+            <a:spLocks noGrp="1"/>
+          </p:cNvSpPr>
+          <p:nvPr>
+            <p:ph type="sldNum" sz="quarter" idx="5"/>
+          </p:nvPr>
+        </p:nvSpPr>
+        <p:spPr/>
+        <p:txBody>
+          <a:bodyPr/>
+          <a:lstStyle/>
+          <a:p>
+            <a:fld id="{CDF59EFB-1334-4D27-AB1B-4993812541CF}" type="slidenum">
+              <a:rPr lang="it-IT" smtClean="0"/>
+              <a:t>17</a:t>
+            </a:fld>
+            <a:endParaRPr lang="it-IT"/>
+          </a:p>
+        </p:txBody>
+      </p:sp>
+    </p:spTree>
+    <p:extLst>
+      <p:ext uri="{BB962C8B-B14F-4D97-AF65-F5344CB8AC3E}">
+        <p14:creationId xmlns:p14="http://schemas.microsoft.com/office/powerpoint/2010/main" val="51612109"/>
       </p:ext>
     </p:extLst>
   </p:cSld>
@@ -6996,6 +7347,45 @@
           </a:p>
         </p:txBody>
       </p:sp>
+      <p:sp>
+        <p:nvSpPr>
+          <p:cNvPr id="5" name="CasellaDiTesto 4">
+            <a:extLst>
+              <a:ext uri="{FF2B5EF4-FFF2-40B4-BE49-F238E27FC236}">
+                <a16:creationId xmlns:a16="http://schemas.microsoft.com/office/drawing/2014/main" id="{27A4D4AF-A9E4-5C70-EE81-FDA42C40BDDE}"/>
+              </a:ext>
+            </a:extLst>
+          </p:cNvPr>
+          <p:cNvSpPr txBox="1"/>
+          <p:nvPr/>
+        </p:nvSpPr>
+        <p:spPr>
+          <a:xfrm>
+            <a:off x="11249247" y="6294475"/>
+            <a:ext cx="671979" cy="369332"/>
+          </a:xfrm>
+          <a:prstGeom prst="rect">
+            <a:avLst/>
+          </a:prstGeom>
+          <a:noFill/>
+        </p:spPr>
+        <p:txBody>
+          <a:bodyPr wrap="none" rtlCol="0">
+            <a:spAutoFit/>
+          </a:bodyPr>
+          <a:lstStyle/>
+          <a:p>
+            <a:r>
+              <a:rPr lang="en-US" dirty="0">
+                <a:solidFill>
+                  <a:schemeClr val="bg1"/>
+                </a:solidFill>
+              </a:rPr>
+              <a:t>1/17</a:t>
+            </a:r>
+          </a:p>
+        </p:txBody>
+      </p:sp>
     </p:spTree>
     <p:extLst>
       <p:ext uri="{BB962C8B-B14F-4D97-AF65-F5344CB8AC3E}">
@@ -7507,6 +7897,45 @@
             <a:r>
               <a:rPr lang="en-US" noProof="0" dirty="0"/>
               <a:t>Performance scales directly with more data and longer training </a:t>
+            </a:r>
+          </a:p>
+        </p:txBody>
+      </p:sp>
+      <p:sp>
+        <p:nvSpPr>
+          <p:cNvPr id="6" name="CasellaDiTesto 5">
+            <a:extLst>
+              <a:ext uri="{FF2B5EF4-FFF2-40B4-BE49-F238E27FC236}">
+                <a16:creationId xmlns:a16="http://schemas.microsoft.com/office/drawing/2014/main" id="{7DA7553C-3EE1-2C4B-65EB-E9D83928CC1B}"/>
+              </a:ext>
+            </a:extLst>
+          </p:cNvPr>
+          <p:cNvSpPr txBox="1"/>
+          <p:nvPr/>
+        </p:nvSpPr>
+        <p:spPr>
+          <a:xfrm>
+            <a:off x="11249247" y="6294475"/>
+            <a:ext cx="793807" cy="369332"/>
+          </a:xfrm>
+          <a:prstGeom prst="rect">
+            <a:avLst/>
+          </a:prstGeom>
+          <a:noFill/>
+        </p:spPr>
+        <p:txBody>
+          <a:bodyPr wrap="none" rtlCol="0">
+            <a:spAutoFit/>
+          </a:bodyPr>
+          <a:lstStyle/>
+          <a:p>
+            <a:r>
+              <a:rPr lang="en-US" dirty="0">
+                <a:solidFill>
+                  <a:schemeClr val="bg1"/>
+                </a:solidFill>
+              </a:rPr>
+              <a:t>10/17</a:t>
             </a:r>
           </a:p>
         </p:txBody>
@@ -8259,6 +8688,45 @@
             <a:r>
               <a:rPr lang="en-US" noProof="0" dirty="0"/>
               <a:t>All pipeline evaluations run on 20’000 samples</a:t>
+            </a:r>
+          </a:p>
+        </p:txBody>
+      </p:sp>
+      <p:sp>
+        <p:nvSpPr>
+          <p:cNvPr id="8" name="CasellaDiTesto 7">
+            <a:extLst>
+              <a:ext uri="{FF2B5EF4-FFF2-40B4-BE49-F238E27FC236}">
+                <a16:creationId xmlns:a16="http://schemas.microsoft.com/office/drawing/2014/main" id="{4A74ABA8-E75B-57D4-DE0B-1AF862E66A5F}"/>
+              </a:ext>
+            </a:extLst>
+          </p:cNvPr>
+          <p:cNvSpPr txBox="1"/>
+          <p:nvPr/>
+        </p:nvSpPr>
+        <p:spPr>
+          <a:xfrm>
+            <a:off x="11249247" y="6294475"/>
+            <a:ext cx="793807" cy="369332"/>
+          </a:xfrm>
+          <a:prstGeom prst="rect">
+            <a:avLst/>
+          </a:prstGeom>
+          <a:noFill/>
+        </p:spPr>
+        <p:txBody>
+          <a:bodyPr wrap="none" rtlCol="0">
+            <a:spAutoFit/>
+          </a:bodyPr>
+          <a:lstStyle/>
+          <a:p>
+            <a:r>
+              <a:rPr lang="en-US" dirty="0">
+                <a:solidFill>
+                  <a:schemeClr val="bg1"/>
+                </a:solidFill>
+              </a:rPr>
+              <a:t>11/17</a:t>
             </a:r>
           </a:p>
         </p:txBody>
@@ -9037,6 +9505,45 @@
             <a:r>
               <a:rPr lang="en-US" noProof="0" dirty="0"/>
               <a:t>in our custom pipeline</a:t>
+            </a:r>
+          </a:p>
+        </p:txBody>
+      </p:sp>
+      <p:sp>
+        <p:nvSpPr>
+          <p:cNvPr id="5" name="CasellaDiTesto 4">
+            <a:extLst>
+              <a:ext uri="{FF2B5EF4-FFF2-40B4-BE49-F238E27FC236}">
+                <a16:creationId xmlns:a16="http://schemas.microsoft.com/office/drawing/2014/main" id="{05959B99-0516-3DE4-AB6A-A28ED79F6432}"/>
+              </a:ext>
+            </a:extLst>
+          </p:cNvPr>
+          <p:cNvSpPr txBox="1"/>
+          <p:nvPr/>
+        </p:nvSpPr>
+        <p:spPr>
+          <a:xfrm>
+            <a:off x="11249247" y="6294475"/>
+            <a:ext cx="793807" cy="369332"/>
+          </a:xfrm>
+          <a:prstGeom prst="rect">
+            <a:avLst/>
+          </a:prstGeom>
+          <a:noFill/>
+        </p:spPr>
+        <p:txBody>
+          <a:bodyPr wrap="none" rtlCol="0">
+            <a:spAutoFit/>
+          </a:bodyPr>
+          <a:lstStyle/>
+          <a:p>
+            <a:r>
+              <a:rPr lang="en-US" dirty="0">
+                <a:solidFill>
+                  <a:schemeClr val="bg1"/>
+                </a:solidFill>
+              </a:rPr>
+              <a:t>12/17</a:t>
             </a:r>
           </a:p>
         </p:txBody>
@@ -9835,6 +10342,45 @@
           </a:p>
         </p:txBody>
       </p:sp>
+      <p:sp>
+        <p:nvSpPr>
+          <p:cNvPr id="7" name="CasellaDiTesto 6">
+            <a:extLst>
+              <a:ext uri="{FF2B5EF4-FFF2-40B4-BE49-F238E27FC236}">
+                <a16:creationId xmlns:a16="http://schemas.microsoft.com/office/drawing/2014/main" id="{DF34595D-3915-C574-6234-CE05E2821D01}"/>
+              </a:ext>
+            </a:extLst>
+          </p:cNvPr>
+          <p:cNvSpPr txBox="1"/>
+          <p:nvPr/>
+        </p:nvSpPr>
+        <p:spPr>
+          <a:xfrm>
+            <a:off x="11249247" y="6294475"/>
+            <a:ext cx="793807" cy="369332"/>
+          </a:xfrm>
+          <a:prstGeom prst="rect">
+            <a:avLst/>
+          </a:prstGeom>
+          <a:noFill/>
+        </p:spPr>
+        <p:txBody>
+          <a:bodyPr wrap="none" rtlCol="0">
+            <a:spAutoFit/>
+          </a:bodyPr>
+          <a:lstStyle/>
+          <a:p>
+            <a:r>
+              <a:rPr lang="en-US" dirty="0">
+                <a:solidFill>
+                  <a:schemeClr val="bg1"/>
+                </a:solidFill>
+              </a:rPr>
+              <a:t>13/17</a:t>
+            </a:r>
+          </a:p>
+        </p:txBody>
+      </p:sp>
     </p:spTree>
     <p:extLst>
       <p:ext uri="{BB962C8B-B14F-4D97-AF65-F5344CB8AC3E}">
@@ -9926,7 +10472,7 @@
           <p:nvPr>
             <p:extLst>
               <p:ext uri="{D42A27DB-BD31-4B8C-83A1-F6EECF244321}">
-                <p14:modId xmlns:p14="http://schemas.microsoft.com/office/powerpoint/2010/main" val="2665123160"/>
+                <p14:modId xmlns:p14="http://schemas.microsoft.com/office/powerpoint/2010/main" val="1230243429"/>
               </p:ext>
             </p:extLst>
           </p:nvPr>
@@ -10564,7 +11110,7 @@
                       <a:pPr algn="ctr"/>
                       <a:r>
                         <a:rPr lang="en-US" noProof="0" dirty="0"/>
-                        <a:t>TEST%</a:t>
+                        <a:t>86.9%</a:t>
                       </a:r>
                     </a:p>
                   </a:txBody>
@@ -10633,6 +11179,45 @@
             <a:r>
               <a:rPr lang="en-US" noProof="0" dirty="0"/>
               <a:t>highlighting the superior robustness of its advanced recognition architecture.</a:t>
+            </a:r>
+          </a:p>
+        </p:txBody>
+      </p:sp>
+      <p:sp>
+        <p:nvSpPr>
+          <p:cNvPr id="5" name="CasellaDiTesto 4">
+            <a:extLst>
+              <a:ext uri="{FF2B5EF4-FFF2-40B4-BE49-F238E27FC236}">
+                <a16:creationId xmlns:a16="http://schemas.microsoft.com/office/drawing/2014/main" id="{C1FCC323-AD71-7FCF-9887-EE5F80283A97}"/>
+              </a:ext>
+            </a:extLst>
+          </p:cNvPr>
+          <p:cNvSpPr txBox="1"/>
+          <p:nvPr/>
+        </p:nvSpPr>
+        <p:spPr>
+          <a:xfrm>
+            <a:off x="11249247" y="6294475"/>
+            <a:ext cx="793807" cy="369332"/>
+          </a:xfrm>
+          <a:prstGeom prst="rect">
+            <a:avLst/>
+          </a:prstGeom>
+          <a:noFill/>
+        </p:spPr>
+        <p:txBody>
+          <a:bodyPr wrap="none" rtlCol="0">
+            <a:spAutoFit/>
+          </a:bodyPr>
+          <a:lstStyle/>
+          <a:p>
+            <a:r>
+              <a:rPr lang="en-US" dirty="0">
+                <a:solidFill>
+                  <a:schemeClr val="bg1"/>
+                </a:solidFill>
+              </a:rPr>
+              <a:t>14/17</a:t>
             </a:r>
           </a:p>
         </p:txBody>
@@ -10759,6 +11344,45 @@
           </a:p>
         </p:txBody>
       </p:sp>
+      <p:sp>
+        <p:nvSpPr>
+          <p:cNvPr id="5" name="CasellaDiTesto 4">
+            <a:extLst>
+              <a:ext uri="{FF2B5EF4-FFF2-40B4-BE49-F238E27FC236}">
+                <a16:creationId xmlns:a16="http://schemas.microsoft.com/office/drawing/2014/main" id="{859D2F94-3D95-F2BB-5D7E-3AFDD3B3F13C}"/>
+              </a:ext>
+            </a:extLst>
+          </p:cNvPr>
+          <p:cNvSpPr txBox="1"/>
+          <p:nvPr/>
+        </p:nvSpPr>
+        <p:spPr>
+          <a:xfrm>
+            <a:off x="11249247" y="6294475"/>
+            <a:ext cx="793807" cy="369332"/>
+          </a:xfrm>
+          <a:prstGeom prst="rect">
+            <a:avLst/>
+          </a:prstGeom>
+          <a:noFill/>
+        </p:spPr>
+        <p:txBody>
+          <a:bodyPr wrap="none" rtlCol="0">
+            <a:spAutoFit/>
+          </a:bodyPr>
+          <a:lstStyle/>
+          <a:p>
+            <a:r>
+              <a:rPr lang="en-US" dirty="0">
+                <a:solidFill>
+                  <a:schemeClr val="bg1"/>
+                </a:solidFill>
+              </a:rPr>
+              <a:t>15/17</a:t>
+            </a:r>
+          </a:p>
+        </p:txBody>
+      </p:sp>
     </p:spTree>
     <p:extLst>
       <p:ext uri="{BB962C8B-B14F-4D97-AF65-F5344CB8AC3E}">
@@ -10891,6 +11515,45 @@
           </a:p>
         </p:txBody>
       </p:sp>
+      <p:sp>
+        <p:nvSpPr>
+          <p:cNvPr id="12" name="CasellaDiTesto 11">
+            <a:extLst>
+              <a:ext uri="{FF2B5EF4-FFF2-40B4-BE49-F238E27FC236}">
+                <a16:creationId xmlns:a16="http://schemas.microsoft.com/office/drawing/2014/main" id="{2FD8C83B-D4F1-F68A-C7B7-744E6E017389}"/>
+              </a:ext>
+            </a:extLst>
+          </p:cNvPr>
+          <p:cNvSpPr txBox="1"/>
+          <p:nvPr/>
+        </p:nvSpPr>
+        <p:spPr>
+          <a:xfrm>
+            <a:off x="11249247" y="6294475"/>
+            <a:ext cx="793807" cy="369332"/>
+          </a:xfrm>
+          <a:prstGeom prst="rect">
+            <a:avLst/>
+          </a:prstGeom>
+          <a:noFill/>
+        </p:spPr>
+        <p:txBody>
+          <a:bodyPr wrap="none" rtlCol="0">
+            <a:spAutoFit/>
+          </a:bodyPr>
+          <a:lstStyle/>
+          <a:p>
+            <a:r>
+              <a:rPr lang="en-US" dirty="0">
+                <a:solidFill>
+                  <a:schemeClr val="bg1"/>
+                </a:solidFill>
+              </a:rPr>
+              <a:t>16/17</a:t>
+            </a:r>
+          </a:p>
+        </p:txBody>
+      </p:sp>
     </p:spTree>
     <p:extLst>
       <p:ext uri="{BB962C8B-B14F-4D97-AF65-F5344CB8AC3E}">
@@ -10996,7 +11659,7 @@
             </a:r>
             <a:r>
               <a:rPr lang="en-US" noProof="0" dirty="0">
-                <a:hlinkClick r:id="rId2"/>
+                <a:hlinkClick r:id="rId3"/>
               </a:rPr>
               <a:t>https://doi.org/10.3390/s24092791</a:t>
             </a:r>
@@ -11009,7 +11672,7 @@
             </a:pPr>
             <a:r>
               <a:rPr lang="en-US" noProof="0" dirty="0">
-                <a:hlinkClick r:id="rId3"/>
+                <a:hlinkClick r:id="rId4"/>
               </a:rPr>
               <a:t>https://github.com/ultralytics/yolov5</a:t>
             </a:r>
@@ -11064,7 +11727,7 @@
             </a:pPr>
             <a:r>
               <a:rPr lang="en-US" noProof="0" dirty="0">
-                <a:hlinkClick r:id="rId4"/>
+                <a:hlinkClick r:id="rId5"/>
               </a:rPr>
               <a:t>https://huggingface.co/keremberke/yolov5m-license-plate</a:t>
             </a:r>
@@ -11077,11 +11740,50 @@
             </a:pPr>
             <a:r>
               <a:rPr lang="en-US" noProof="0" dirty="0">
-                <a:hlinkClick r:id="rId5"/>
+                <a:hlinkClick r:id="rId6"/>
               </a:rPr>
               <a:t>https://github.com/PaddlePaddle/PaddleOCR</a:t>
             </a:r>
             <a:endParaRPr lang="en-US" noProof="0" dirty="0"/>
+          </a:p>
+        </p:txBody>
+      </p:sp>
+      <p:sp>
+        <p:nvSpPr>
+          <p:cNvPr id="5" name="CasellaDiTesto 4">
+            <a:extLst>
+              <a:ext uri="{FF2B5EF4-FFF2-40B4-BE49-F238E27FC236}">
+                <a16:creationId xmlns:a16="http://schemas.microsoft.com/office/drawing/2014/main" id="{0FE25E3C-6FBB-1F6D-5700-A20341B3A114}"/>
+              </a:ext>
+            </a:extLst>
+          </p:cNvPr>
+          <p:cNvSpPr txBox="1"/>
+          <p:nvPr/>
+        </p:nvSpPr>
+        <p:spPr>
+          <a:xfrm>
+            <a:off x="11249247" y="6294475"/>
+            <a:ext cx="793807" cy="369332"/>
+          </a:xfrm>
+          <a:prstGeom prst="rect">
+            <a:avLst/>
+          </a:prstGeom>
+          <a:noFill/>
+        </p:spPr>
+        <p:txBody>
+          <a:bodyPr wrap="none" rtlCol="0">
+            <a:spAutoFit/>
+          </a:bodyPr>
+          <a:lstStyle/>
+          <a:p>
+            <a:r>
+              <a:rPr lang="en-US" dirty="0">
+                <a:solidFill>
+                  <a:schemeClr val="bg1"/>
+                </a:solidFill>
+              </a:rPr>
+              <a:t>17/17</a:t>
+            </a:r>
           </a:p>
         </p:txBody>
       </p:sp>
@@ -11242,6 +11944,45 @@
           </a:p>
         </p:txBody>
       </p:sp>
+      <p:sp>
+        <p:nvSpPr>
+          <p:cNvPr id="5" name="CasellaDiTesto 4">
+            <a:extLst>
+              <a:ext uri="{FF2B5EF4-FFF2-40B4-BE49-F238E27FC236}">
+                <a16:creationId xmlns:a16="http://schemas.microsoft.com/office/drawing/2014/main" id="{1AEC6E41-3D0C-2A93-85C7-B3E0C961D26B}"/>
+              </a:ext>
+            </a:extLst>
+          </p:cNvPr>
+          <p:cNvSpPr txBox="1"/>
+          <p:nvPr/>
+        </p:nvSpPr>
+        <p:spPr>
+          <a:xfrm>
+            <a:off x="11249247" y="6294475"/>
+            <a:ext cx="671979" cy="369332"/>
+          </a:xfrm>
+          <a:prstGeom prst="rect">
+            <a:avLst/>
+          </a:prstGeom>
+          <a:noFill/>
+        </p:spPr>
+        <p:txBody>
+          <a:bodyPr wrap="none" rtlCol="0">
+            <a:spAutoFit/>
+          </a:bodyPr>
+          <a:lstStyle/>
+          <a:p>
+            <a:r>
+              <a:rPr lang="en-US" dirty="0">
+                <a:solidFill>
+                  <a:schemeClr val="bg1"/>
+                </a:solidFill>
+              </a:rPr>
+              <a:t>2/17</a:t>
+            </a:r>
+          </a:p>
+        </p:txBody>
+      </p:sp>
     </p:spTree>
     <p:extLst>
       <p:ext uri="{BB962C8B-B14F-4D97-AF65-F5344CB8AC3E}">
@@ -11369,6 +12110,45 @@
             <a:r>
               <a:rPr lang="en-US" noProof="0" dirty="0"/>
               <a:t>This task is widely used in intelligent transportation systems, such as automated toll collection, traffic law enforcement, and vehicle tracking.</a:t>
+            </a:r>
+          </a:p>
+        </p:txBody>
+      </p:sp>
+      <p:sp>
+        <p:nvSpPr>
+          <p:cNvPr id="5" name="CasellaDiTesto 4">
+            <a:extLst>
+              <a:ext uri="{FF2B5EF4-FFF2-40B4-BE49-F238E27FC236}">
+                <a16:creationId xmlns:a16="http://schemas.microsoft.com/office/drawing/2014/main" id="{DDCF1B97-1FC0-D26F-8C8E-64E231FD84A1}"/>
+              </a:ext>
+            </a:extLst>
+          </p:cNvPr>
+          <p:cNvSpPr txBox="1"/>
+          <p:nvPr/>
+        </p:nvSpPr>
+        <p:spPr>
+          <a:xfrm>
+            <a:off x="11249247" y="6294475"/>
+            <a:ext cx="671979" cy="369332"/>
+          </a:xfrm>
+          <a:prstGeom prst="rect">
+            <a:avLst/>
+          </a:prstGeom>
+          <a:noFill/>
+        </p:spPr>
+        <p:txBody>
+          <a:bodyPr wrap="none" rtlCol="0">
+            <a:spAutoFit/>
+          </a:bodyPr>
+          <a:lstStyle/>
+          <a:p>
+            <a:r>
+              <a:rPr lang="en-US" dirty="0">
+                <a:solidFill>
+                  <a:schemeClr val="bg1"/>
+                </a:solidFill>
+              </a:rPr>
+              <a:t>3/17</a:t>
             </a:r>
           </a:p>
         </p:txBody>
@@ -11806,6 +12586,45 @@
           </a:p>
         </p:txBody>
       </p:sp>
+      <p:sp>
+        <p:nvSpPr>
+          <p:cNvPr id="6" name="CasellaDiTesto 5">
+            <a:extLst>
+              <a:ext uri="{FF2B5EF4-FFF2-40B4-BE49-F238E27FC236}">
+                <a16:creationId xmlns:a16="http://schemas.microsoft.com/office/drawing/2014/main" id="{56D49093-628A-6351-3A50-E169EB99A712}"/>
+              </a:ext>
+            </a:extLst>
+          </p:cNvPr>
+          <p:cNvSpPr txBox="1"/>
+          <p:nvPr/>
+        </p:nvSpPr>
+        <p:spPr>
+          <a:xfrm>
+            <a:off x="11249247" y="6294475"/>
+            <a:ext cx="671979" cy="369332"/>
+          </a:xfrm>
+          <a:prstGeom prst="rect">
+            <a:avLst/>
+          </a:prstGeom>
+          <a:noFill/>
+        </p:spPr>
+        <p:txBody>
+          <a:bodyPr wrap="none" rtlCol="0">
+            <a:spAutoFit/>
+          </a:bodyPr>
+          <a:lstStyle/>
+          <a:p>
+            <a:r>
+              <a:rPr lang="en-US" dirty="0">
+                <a:solidFill>
+                  <a:schemeClr val="bg1"/>
+                </a:solidFill>
+              </a:rPr>
+              <a:t>4/17</a:t>
+            </a:r>
+          </a:p>
+        </p:txBody>
+      </p:sp>
     </p:spTree>
     <p:extLst>
       <p:ext uri="{BB962C8B-B14F-4D97-AF65-F5344CB8AC3E}">
@@ -12304,6 +13123,45 @@
           </a:p>
         </p:txBody>
       </p:sp>
+      <p:sp>
+        <p:nvSpPr>
+          <p:cNvPr id="6" name="CasellaDiTesto 5">
+            <a:extLst>
+              <a:ext uri="{FF2B5EF4-FFF2-40B4-BE49-F238E27FC236}">
+                <a16:creationId xmlns:a16="http://schemas.microsoft.com/office/drawing/2014/main" id="{4AF2F4B2-5590-72E0-7955-AF8B7C8D5520}"/>
+              </a:ext>
+            </a:extLst>
+          </p:cNvPr>
+          <p:cNvSpPr txBox="1"/>
+          <p:nvPr/>
+        </p:nvSpPr>
+        <p:spPr>
+          <a:xfrm>
+            <a:off x="11249247" y="6294475"/>
+            <a:ext cx="671979" cy="369332"/>
+          </a:xfrm>
+          <a:prstGeom prst="rect">
+            <a:avLst/>
+          </a:prstGeom>
+          <a:noFill/>
+        </p:spPr>
+        <p:txBody>
+          <a:bodyPr wrap="none" rtlCol="0">
+            <a:spAutoFit/>
+          </a:bodyPr>
+          <a:lstStyle/>
+          <a:p>
+            <a:r>
+              <a:rPr lang="en-US" dirty="0">
+                <a:solidFill>
+                  <a:schemeClr val="bg1"/>
+                </a:solidFill>
+              </a:rPr>
+              <a:t>5/17</a:t>
+            </a:r>
+          </a:p>
+        </p:txBody>
+      </p:sp>
     </p:spTree>
     <p:extLst>
       <p:ext uri="{BB962C8B-B14F-4D97-AF65-F5344CB8AC3E}">
@@ -12441,6 +13299,45 @@
           </a:p>
         </p:txBody>
       </p:sp>
+      <p:sp>
+        <p:nvSpPr>
+          <p:cNvPr id="5" name="CasellaDiTesto 4">
+            <a:extLst>
+              <a:ext uri="{FF2B5EF4-FFF2-40B4-BE49-F238E27FC236}">
+                <a16:creationId xmlns:a16="http://schemas.microsoft.com/office/drawing/2014/main" id="{9ECAA432-2F49-FB93-A14E-9EDFB589C4DD}"/>
+              </a:ext>
+            </a:extLst>
+          </p:cNvPr>
+          <p:cNvSpPr txBox="1"/>
+          <p:nvPr/>
+        </p:nvSpPr>
+        <p:spPr>
+          <a:xfrm>
+            <a:off x="11249247" y="6294475"/>
+            <a:ext cx="671979" cy="369332"/>
+          </a:xfrm>
+          <a:prstGeom prst="rect">
+            <a:avLst/>
+          </a:prstGeom>
+          <a:noFill/>
+        </p:spPr>
+        <p:txBody>
+          <a:bodyPr wrap="none" rtlCol="0">
+            <a:spAutoFit/>
+          </a:bodyPr>
+          <a:lstStyle/>
+          <a:p>
+            <a:r>
+              <a:rPr lang="en-US" dirty="0">
+                <a:solidFill>
+                  <a:schemeClr val="bg1"/>
+                </a:solidFill>
+              </a:rPr>
+              <a:t>6/17</a:t>
+            </a:r>
+          </a:p>
+        </p:txBody>
+      </p:sp>
     </p:spTree>
     <p:extLst>
       <p:ext uri="{BB962C8B-B14F-4D97-AF65-F5344CB8AC3E}">
@@ -12556,7 +13453,7 @@
           <p:nvPr/>
         </p:nvPicPr>
         <p:blipFill>
-          <a:blip r:embed="rId2"/>
+          <a:blip r:embed="rId3"/>
           <a:stretch>
             <a:fillRect/>
           </a:stretch>
@@ -12897,6 +13794,45 @@
           </a:p>
         </p:txBody>
       </p:sp>
+      <p:sp>
+        <p:nvSpPr>
+          <p:cNvPr id="8" name="CasellaDiTesto 7">
+            <a:extLst>
+              <a:ext uri="{FF2B5EF4-FFF2-40B4-BE49-F238E27FC236}">
+                <a16:creationId xmlns:a16="http://schemas.microsoft.com/office/drawing/2014/main" id="{568B32AF-354F-5EE9-040D-B02D4AFE8C3A}"/>
+              </a:ext>
+            </a:extLst>
+          </p:cNvPr>
+          <p:cNvSpPr txBox="1"/>
+          <p:nvPr/>
+        </p:nvSpPr>
+        <p:spPr>
+          <a:xfrm>
+            <a:off x="11249247" y="6294475"/>
+            <a:ext cx="671979" cy="369332"/>
+          </a:xfrm>
+          <a:prstGeom prst="rect">
+            <a:avLst/>
+          </a:prstGeom>
+          <a:noFill/>
+        </p:spPr>
+        <p:txBody>
+          <a:bodyPr wrap="none" rtlCol="0">
+            <a:spAutoFit/>
+          </a:bodyPr>
+          <a:lstStyle/>
+          <a:p>
+            <a:r>
+              <a:rPr lang="en-US" dirty="0">
+                <a:solidFill>
+                  <a:schemeClr val="bg1"/>
+                </a:solidFill>
+              </a:rPr>
+              <a:t>7/17</a:t>
+            </a:r>
+          </a:p>
+        </p:txBody>
+      </p:sp>
     </p:spTree>
     <p:extLst>
       <p:ext uri="{BB962C8B-B14F-4D97-AF65-F5344CB8AC3E}">
@@ -13070,6 +14006,45 @@
               <a:t>https://github.com/PaddlePaddle/PaddleOCR</a:t>
             </a:r>
             <a:endParaRPr lang="en-US" noProof="0" dirty="0"/>
+          </a:p>
+        </p:txBody>
+      </p:sp>
+      <p:sp>
+        <p:nvSpPr>
+          <p:cNvPr id="6" name="CasellaDiTesto 5">
+            <a:extLst>
+              <a:ext uri="{FF2B5EF4-FFF2-40B4-BE49-F238E27FC236}">
+                <a16:creationId xmlns:a16="http://schemas.microsoft.com/office/drawing/2014/main" id="{A88151CA-A3AA-92E5-A25A-F19780672DA3}"/>
+              </a:ext>
+            </a:extLst>
+          </p:cNvPr>
+          <p:cNvSpPr txBox="1"/>
+          <p:nvPr/>
+        </p:nvSpPr>
+        <p:spPr>
+          <a:xfrm>
+            <a:off x="11249247" y="6294475"/>
+            <a:ext cx="671979" cy="369332"/>
+          </a:xfrm>
+          <a:prstGeom prst="rect">
+            <a:avLst/>
+          </a:prstGeom>
+          <a:noFill/>
+        </p:spPr>
+        <p:txBody>
+          <a:bodyPr wrap="none" rtlCol="0">
+            <a:spAutoFit/>
+          </a:bodyPr>
+          <a:lstStyle/>
+          <a:p>
+            <a:r>
+              <a:rPr lang="en-US" dirty="0">
+                <a:solidFill>
+                  <a:schemeClr val="bg1"/>
+                </a:solidFill>
+              </a:rPr>
+              <a:t>8/17</a:t>
+            </a:r>
           </a:p>
         </p:txBody>
       </p:sp>
@@ -13646,6 +14621,45 @@
             <a:r>
               <a:rPr lang="en-US" noProof="0" dirty="0"/>
               <a:t>YOLO models trained on 20 epochs</a:t>
+            </a:r>
+          </a:p>
+        </p:txBody>
+      </p:sp>
+      <p:sp>
+        <p:nvSpPr>
+          <p:cNvPr id="7" name="CasellaDiTesto 6">
+            <a:extLst>
+              <a:ext uri="{FF2B5EF4-FFF2-40B4-BE49-F238E27FC236}">
+                <a16:creationId xmlns:a16="http://schemas.microsoft.com/office/drawing/2014/main" id="{0EF78FA9-8511-92EC-A4B4-63DB9374909D}"/>
+              </a:ext>
+            </a:extLst>
+          </p:cNvPr>
+          <p:cNvSpPr txBox="1"/>
+          <p:nvPr/>
+        </p:nvSpPr>
+        <p:spPr>
+          <a:xfrm>
+            <a:off x="11249247" y="6294475"/>
+            <a:ext cx="671979" cy="369332"/>
+          </a:xfrm>
+          <a:prstGeom prst="rect">
+            <a:avLst/>
+          </a:prstGeom>
+          <a:noFill/>
+        </p:spPr>
+        <p:txBody>
+          <a:bodyPr wrap="none" rtlCol="0">
+            <a:spAutoFit/>
+          </a:bodyPr>
+          <a:lstStyle/>
+          <a:p>
+            <a:r>
+              <a:rPr lang="en-US" dirty="0">
+                <a:solidFill>
+                  <a:schemeClr val="bg1"/>
+                </a:solidFill>
+              </a:rPr>
+              <a:t>9/17</a:t>
             </a:r>
           </a:p>
         </p:txBody>

</xml_diff>